<commit_message>
New CR and IR top 5 calcs and plots; and other random updates from before I went to Dallas 9/4/23
</commit_message>
<xml_diff>
--- a/Notes/Clearance and Ingestion Rates/CR FR from other papers.pptx
+++ b/Notes/Clearance and Ingestion Rates/CR FR from other papers.pptx
@@ -277,7 +277,7 @@
           <a:p>
             <a:fld id="{FFD9D699-374E-7542-B656-E0C537E8444C}" type="datetimeFigureOut">
               <a:rPr lang="en-US" smtClean="0"/>
-              <a:t>4/27/23</a:t>
+              <a:t>8/24/23</a:t>
             </a:fld>
             <a:endParaRPr lang="en-US"/>
           </a:p>
@@ -475,7 +475,7 @@
           <a:p>
             <a:fld id="{FFD9D699-374E-7542-B656-E0C537E8444C}" type="datetimeFigureOut">
               <a:rPr lang="en-US" smtClean="0"/>
-              <a:t>4/27/23</a:t>
+              <a:t>8/24/23</a:t>
             </a:fld>
             <a:endParaRPr lang="en-US"/>
           </a:p>
@@ -683,7 +683,7 @@
           <a:p>
             <a:fld id="{FFD9D699-374E-7542-B656-E0C537E8444C}" type="datetimeFigureOut">
               <a:rPr lang="en-US" smtClean="0"/>
-              <a:t>4/27/23</a:t>
+              <a:t>8/24/23</a:t>
             </a:fld>
             <a:endParaRPr lang="en-US"/>
           </a:p>
@@ -881,7 +881,7 @@
           <a:p>
             <a:fld id="{FFD9D699-374E-7542-B656-E0C537E8444C}" type="datetimeFigureOut">
               <a:rPr lang="en-US" smtClean="0"/>
-              <a:t>4/27/23</a:t>
+              <a:t>8/24/23</a:t>
             </a:fld>
             <a:endParaRPr lang="en-US"/>
           </a:p>
@@ -1156,7 +1156,7 @@
           <a:p>
             <a:fld id="{FFD9D699-374E-7542-B656-E0C537E8444C}" type="datetimeFigureOut">
               <a:rPr lang="en-US" smtClean="0"/>
-              <a:t>4/27/23</a:t>
+              <a:t>8/24/23</a:t>
             </a:fld>
             <a:endParaRPr lang="en-US"/>
           </a:p>
@@ -1421,7 +1421,7 @@
           <a:p>
             <a:fld id="{FFD9D699-374E-7542-B656-E0C537E8444C}" type="datetimeFigureOut">
               <a:rPr lang="en-US" smtClean="0"/>
-              <a:t>4/27/23</a:t>
+              <a:t>8/24/23</a:t>
             </a:fld>
             <a:endParaRPr lang="en-US"/>
           </a:p>
@@ -1833,7 +1833,7 @@
           <a:p>
             <a:fld id="{FFD9D699-374E-7542-B656-E0C537E8444C}" type="datetimeFigureOut">
               <a:rPr lang="en-US" smtClean="0"/>
-              <a:t>4/27/23</a:t>
+              <a:t>8/24/23</a:t>
             </a:fld>
             <a:endParaRPr lang="en-US"/>
           </a:p>
@@ -1974,7 +1974,7 @@
           <a:p>
             <a:fld id="{FFD9D699-374E-7542-B656-E0C537E8444C}" type="datetimeFigureOut">
               <a:rPr lang="en-US" smtClean="0"/>
-              <a:t>4/27/23</a:t>
+              <a:t>8/24/23</a:t>
             </a:fld>
             <a:endParaRPr lang="en-US"/>
           </a:p>
@@ -2087,7 +2087,7 @@
           <a:p>
             <a:fld id="{FFD9D699-374E-7542-B656-E0C537E8444C}" type="datetimeFigureOut">
               <a:rPr lang="en-US" smtClean="0"/>
-              <a:t>4/27/23</a:t>
+              <a:t>8/24/23</a:t>
             </a:fld>
             <a:endParaRPr lang="en-US"/>
           </a:p>
@@ -2398,7 +2398,7 @@
           <a:p>
             <a:fld id="{FFD9D699-374E-7542-B656-E0C537E8444C}" type="datetimeFigureOut">
               <a:rPr lang="en-US" smtClean="0"/>
-              <a:t>4/27/23</a:t>
+              <a:t>8/24/23</a:t>
             </a:fld>
             <a:endParaRPr lang="en-US"/>
           </a:p>
@@ -2686,7 +2686,7 @@
           <a:p>
             <a:fld id="{FFD9D699-374E-7542-B656-E0C537E8444C}" type="datetimeFigureOut">
               <a:rPr lang="en-US" smtClean="0"/>
-              <a:t>4/27/23</a:t>
+              <a:t>8/24/23</a:t>
             </a:fld>
             <a:endParaRPr lang="en-US"/>
           </a:p>
@@ -2927,7 +2927,7 @@
           <a:p>
             <a:fld id="{FFD9D699-374E-7542-B656-E0C537E8444C}" type="datetimeFigureOut">
               <a:rPr lang="en-US" smtClean="0"/>
-              <a:t>4/27/23</a:t>
+              <a:t>8/24/23</a:t>
             </a:fld>
             <a:endParaRPr lang="en-US"/>
           </a:p>
@@ -3366,8 +3366,8 @@
         </p:blipFill>
         <p:spPr>
           <a:xfrm>
-            <a:off x="747667" y="1471204"/>
-            <a:ext cx="7772400" cy="5113703"/>
+            <a:off x="2209800" y="787344"/>
+            <a:ext cx="8777066" cy="5774704"/>
           </a:xfrm>
           <a:prstGeom prst="rect">
             <a:avLst/>

</xml_diff>